<commit_message>
update ui/add yellow beads
</commit_message>
<xml_diff>
--- a/img/abacus_bead.pptx
+++ b/img/abacus_bead.pptx
@@ -261,7 +261,7 @@
           <a:p>
             <a:fld id="{0F48840C-7329-40F6-A4CA-91BCE454AC2C}" type="datetimeFigureOut">
               <a:rPr lang="en-US" smtClean="0"/>
-              <a:t>8/16/2023</a:t>
+              <a:t>4/28/2024</a:t>
             </a:fld>
             <a:endParaRPr lang="en-US"/>
           </a:p>
@@ -461,7 +461,7 @@
           <a:p>
             <a:fld id="{0F48840C-7329-40F6-A4CA-91BCE454AC2C}" type="datetimeFigureOut">
               <a:rPr lang="en-US" smtClean="0"/>
-              <a:t>8/16/2023</a:t>
+              <a:t>4/28/2024</a:t>
             </a:fld>
             <a:endParaRPr lang="en-US"/>
           </a:p>
@@ -671,7 +671,7 @@
           <a:p>
             <a:fld id="{0F48840C-7329-40F6-A4CA-91BCE454AC2C}" type="datetimeFigureOut">
               <a:rPr lang="en-US" smtClean="0"/>
-              <a:t>8/16/2023</a:t>
+              <a:t>4/28/2024</a:t>
             </a:fld>
             <a:endParaRPr lang="en-US"/>
           </a:p>
@@ -871,7 +871,7 @@
           <a:p>
             <a:fld id="{0F48840C-7329-40F6-A4CA-91BCE454AC2C}" type="datetimeFigureOut">
               <a:rPr lang="en-US" smtClean="0"/>
-              <a:t>8/16/2023</a:t>
+              <a:t>4/28/2024</a:t>
             </a:fld>
             <a:endParaRPr lang="en-US"/>
           </a:p>
@@ -1147,7 +1147,7 @@
           <a:p>
             <a:fld id="{0F48840C-7329-40F6-A4CA-91BCE454AC2C}" type="datetimeFigureOut">
               <a:rPr lang="en-US" smtClean="0"/>
-              <a:t>8/16/2023</a:t>
+              <a:t>4/28/2024</a:t>
             </a:fld>
             <a:endParaRPr lang="en-US"/>
           </a:p>
@@ -1415,7 +1415,7 @@
           <a:p>
             <a:fld id="{0F48840C-7329-40F6-A4CA-91BCE454AC2C}" type="datetimeFigureOut">
               <a:rPr lang="en-US" smtClean="0"/>
-              <a:t>8/16/2023</a:t>
+              <a:t>4/28/2024</a:t>
             </a:fld>
             <a:endParaRPr lang="en-US"/>
           </a:p>
@@ -1830,7 +1830,7 @@
           <a:p>
             <a:fld id="{0F48840C-7329-40F6-A4CA-91BCE454AC2C}" type="datetimeFigureOut">
               <a:rPr lang="en-US" smtClean="0"/>
-              <a:t>8/16/2023</a:t>
+              <a:t>4/28/2024</a:t>
             </a:fld>
             <a:endParaRPr lang="en-US"/>
           </a:p>
@@ -1972,7 +1972,7 @@
           <a:p>
             <a:fld id="{0F48840C-7329-40F6-A4CA-91BCE454AC2C}" type="datetimeFigureOut">
               <a:rPr lang="en-US" smtClean="0"/>
-              <a:t>8/16/2023</a:t>
+              <a:t>4/28/2024</a:t>
             </a:fld>
             <a:endParaRPr lang="en-US"/>
           </a:p>
@@ -2085,7 +2085,7 @@
           <a:p>
             <a:fld id="{0F48840C-7329-40F6-A4CA-91BCE454AC2C}" type="datetimeFigureOut">
               <a:rPr lang="en-US" smtClean="0"/>
-              <a:t>8/16/2023</a:t>
+              <a:t>4/28/2024</a:t>
             </a:fld>
             <a:endParaRPr lang="en-US"/>
           </a:p>
@@ -2398,7 +2398,7 @@
           <a:p>
             <a:fld id="{0F48840C-7329-40F6-A4CA-91BCE454AC2C}" type="datetimeFigureOut">
               <a:rPr lang="en-US" smtClean="0"/>
-              <a:t>8/16/2023</a:t>
+              <a:t>4/28/2024</a:t>
             </a:fld>
             <a:endParaRPr lang="en-US"/>
           </a:p>
@@ -2687,7 +2687,7 @@
           <a:p>
             <a:fld id="{0F48840C-7329-40F6-A4CA-91BCE454AC2C}" type="datetimeFigureOut">
               <a:rPr lang="en-US" smtClean="0"/>
-              <a:t>8/16/2023</a:t>
+              <a:t>4/28/2024</a:t>
             </a:fld>
             <a:endParaRPr lang="en-US"/>
           </a:p>
@@ -2930,7 +2930,7 @@
           <a:p>
             <a:fld id="{0F48840C-7329-40F6-A4CA-91BCE454AC2C}" type="datetimeFigureOut">
               <a:rPr lang="en-US" smtClean="0"/>
-              <a:t>8/16/2023</a:t>
+              <a:t>4/28/2024</a:t>
             </a:fld>
             <a:endParaRPr lang="en-US"/>
           </a:p>
@@ -3447,112 +3447,133 @@
           </a:p>
         </p:txBody>
       </p:sp>
-      <p:sp>
-        <p:nvSpPr>
-          <p:cNvPr id="7" name="สามเหลี่ยมหน้าจั่ว 6">
-            <a:extLst>
-              <a:ext uri="{FF2B5EF4-FFF2-40B4-BE49-F238E27FC236}">
-                <a16:creationId xmlns:a16="http://schemas.microsoft.com/office/drawing/2014/main" id="{4DDC49CD-F1CC-D7D6-B5A7-A354B2662F7A}"/>
-              </a:ext>
-            </a:extLst>
-          </p:cNvPr>
-          <p:cNvSpPr/>
+      <p:grpSp>
+        <p:nvGrpSpPr>
+          <p:cNvPr id="12" name="กลุ่ม 11">
+            <a:extLst>
+              <a:ext uri="{FF2B5EF4-FFF2-40B4-BE49-F238E27FC236}">
+                <a16:creationId xmlns:a16="http://schemas.microsoft.com/office/drawing/2014/main" id="{7893D974-D965-1083-C6CB-E011052FDB76}"/>
+              </a:ext>
+            </a:extLst>
+          </p:cNvPr>
+          <p:cNvGrpSpPr/>
           <p:nvPr/>
-        </p:nvSpPr>
-        <p:spPr>
+        </p:nvGrpSpPr>
+        <p:grpSpPr>
           <a:xfrm>
             <a:off x="3398753" y="1316470"/>
-            <a:ext cx="1107347" cy="453005"/>
+            <a:ext cx="1107347" cy="906010"/>
+            <a:chOff x="3398753" y="1316470"/>
+            <a:chExt cx="1107347" cy="906010"/>
           </a:xfrm>
-          <a:prstGeom prst="triangle">
-            <a:avLst/>
-          </a:prstGeom>
-          <a:solidFill>
-            <a:schemeClr val="accent1"/>
-          </a:solidFill>
-          <a:ln>
-            <a:noFill/>
-          </a:ln>
-        </p:spPr>
-        <p:style>
-          <a:lnRef idx="2">
-            <a:schemeClr val="accent1">
-              <a:shade val="15000"/>
-            </a:schemeClr>
-          </a:lnRef>
-          <a:fillRef idx="1">
-            <a:schemeClr val="accent1"/>
-          </a:fillRef>
-          <a:effectRef idx="0">
-            <a:schemeClr val="accent1"/>
-          </a:effectRef>
-          <a:fontRef idx="minor">
-            <a:schemeClr val="lt1"/>
-          </a:fontRef>
-        </p:style>
-        <p:txBody>
-          <a:bodyPr rtlCol="0" anchor="ctr"/>
-          <a:lstStyle/>
-          <a:p>
-            <a:pPr algn="ctr"/>
-            <a:endParaRPr lang="en-US"/>
-          </a:p>
-        </p:txBody>
-      </p:sp>
-      <p:sp>
-        <p:nvSpPr>
-          <p:cNvPr id="8" name="สามเหลี่ยมหน้าจั่ว 7">
-            <a:extLst>
-              <a:ext uri="{FF2B5EF4-FFF2-40B4-BE49-F238E27FC236}">
-                <a16:creationId xmlns:a16="http://schemas.microsoft.com/office/drawing/2014/main" id="{3DD61DD5-D944-1E9A-EAAE-41CBE0C624B9}"/>
-              </a:ext>
-            </a:extLst>
-          </p:cNvPr>
-          <p:cNvSpPr/>
-          <p:nvPr/>
-        </p:nvSpPr>
-        <p:spPr>
-          <a:xfrm flipV="1">
-            <a:off x="3398753" y="1769475"/>
-            <a:ext cx="1107347" cy="453005"/>
-          </a:xfrm>
-          <a:prstGeom prst="triangle">
-            <a:avLst/>
-          </a:prstGeom>
-          <a:solidFill>
-            <a:schemeClr val="accent1">
-              <a:lumMod val="75000"/>
-            </a:schemeClr>
-          </a:solidFill>
-          <a:ln>
-            <a:noFill/>
-          </a:ln>
-        </p:spPr>
-        <p:style>
-          <a:lnRef idx="2">
-            <a:schemeClr val="accent1">
-              <a:shade val="15000"/>
-            </a:schemeClr>
-          </a:lnRef>
-          <a:fillRef idx="1">
-            <a:schemeClr val="accent1"/>
-          </a:fillRef>
-          <a:effectRef idx="0">
-            <a:schemeClr val="accent1"/>
-          </a:effectRef>
-          <a:fontRef idx="minor">
-            <a:schemeClr val="lt1"/>
-          </a:fontRef>
-        </p:style>
-        <p:txBody>
-          <a:bodyPr rtlCol="0" anchor="ctr"/>
-          <a:lstStyle/>
-          <a:p>
-            <a:pPr algn="ctr"/>
-            <a:endParaRPr lang="en-US"/>
-          </a:p>
-        </p:txBody>
-      </p:sp>
+        </p:grpSpPr>
+        <p:sp>
+          <p:nvSpPr>
+            <p:cNvPr id="7" name="สามเหลี่ยมหน้าจั่ว 6">
+              <a:extLst>
+                <a:ext uri="{FF2B5EF4-FFF2-40B4-BE49-F238E27FC236}">
+                  <a16:creationId xmlns:a16="http://schemas.microsoft.com/office/drawing/2014/main" id="{4DDC49CD-F1CC-D7D6-B5A7-A354B2662F7A}"/>
+                </a:ext>
+              </a:extLst>
+            </p:cNvPr>
+            <p:cNvSpPr/>
+            <p:nvPr/>
+          </p:nvSpPr>
+          <p:spPr>
+            <a:xfrm>
+              <a:off x="3398753" y="1316470"/>
+              <a:ext cx="1107347" cy="453005"/>
+            </a:xfrm>
+            <a:prstGeom prst="triangle">
+              <a:avLst/>
+            </a:prstGeom>
+            <a:solidFill>
+              <a:schemeClr val="accent1"/>
+            </a:solidFill>
+            <a:ln>
+              <a:noFill/>
+            </a:ln>
+          </p:spPr>
+          <p:style>
+            <a:lnRef idx="2">
+              <a:schemeClr val="accent1">
+                <a:shade val="15000"/>
+              </a:schemeClr>
+            </a:lnRef>
+            <a:fillRef idx="1">
+              <a:schemeClr val="accent1"/>
+            </a:fillRef>
+            <a:effectRef idx="0">
+              <a:schemeClr val="accent1"/>
+            </a:effectRef>
+            <a:fontRef idx="minor">
+              <a:schemeClr val="lt1"/>
+            </a:fontRef>
+          </p:style>
+          <p:txBody>
+            <a:bodyPr rtlCol="0" anchor="ctr"/>
+            <a:lstStyle/>
+            <a:p>
+              <a:pPr algn="ctr"/>
+              <a:endParaRPr lang="en-US"/>
+            </a:p>
+          </p:txBody>
+        </p:sp>
+        <p:sp>
+          <p:nvSpPr>
+            <p:cNvPr id="8" name="สามเหลี่ยมหน้าจั่ว 7">
+              <a:extLst>
+                <a:ext uri="{FF2B5EF4-FFF2-40B4-BE49-F238E27FC236}">
+                  <a16:creationId xmlns:a16="http://schemas.microsoft.com/office/drawing/2014/main" id="{3DD61DD5-D944-1E9A-EAAE-41CBE0C624B9}"/>
+                </a:ext>
+              </a:extLst>
+            </p:cNvPr>
+            <p:cNvSpPr/>
+            <p:nvPr/>
+          </p:nvSpPr>
+          <p:spPr>
+            <a:xfrm flipV="1">
+              <a:off x="3398753" y="1769475"/>
+              <a:ext cx="1107347" cy="453005"/>
+            </a:xfrm>
+            <a:prstGeom prst="triangle">
+              <a:avLst/>
+            </a:prstGeom>
+            <a:solidFill>
+              <a:schemeClr val="accent1">
+                <a:lumMod val="75000"/>
+              </a:schemeClr>
+            </a:solidFill>
+            <a:ln>
+              <a:noFill/>
+            </a:ln>
+          </p:spPr>
+          <p:style>
+            <a:lnRef idx="2">
+              <a:schemeClr val="accent1">
+                <a:shade val="15000"/>
+              </a:schemeClr>
+            </a:lnRef>
+            <a:fillRef idx="1">
+              <a:schemeClr val="accent1"/>
+            </a:fillRef>
+            <a:effectRef idx="0">
+              <a:schemeClr val="accent1"/>
+            </a:effectRef>
+            <a:fontRef idx="minor">
+              <a:schemeClr val="lt1"/>
+            </a:fontRef>
+          </p:style>
+          <p:txBody>
+            <a:bodyPr rtlCol="0" anchor="ctr"/>
+            <a:lstStyle/>
+            <a:p>
+              <a:pPr algn="ctr"/>
+              <a:endParaRPr lang="en-US"/>
+            </a:p>
+          </p:txBody>
+        </p:sp>
+      </p:grpSp>
       <p:grpSp>
         <p:nvGrpSpPr>
           <p:cNvPr id="4" name="กลุ่ม 3">
@@ -4036,6 +4057,135 @@
           </a:p>
         </p:txBody>
       </p:sp>
+      <p:grpSp>
+        <p:nvGrpSpPr>
+          <p:cNvPr id="21" name="กลุ่ม 20">
+            <a:extLst>
+              <a:ext uri="{FF2B5EF4-FFF2-40B4-BE49-F238E27FC236}">
+                <a16:creationId xmlns:a16="http://schemas.microsoft.com/office/drawing/2014/main" id="{DFAA9A08-2763-E7E9-B976-40B9642A5D3E}"/>
+              </a:ext>
+            </a:extLst>
+          </p:cNvPr>
+          <p:cNvGrpSpPr/>
+          <p:nvPr/>
+        </p:nvGrpSpPr>
+        <p:grpSpPr>
+          <a:xfrm>
+            <a:off x="3439486" y="2911776"/>
+            <a:ext cx="1107347" cy="906010"/>
+            <a:chOff x="3439486" y="2911776"/>
+            <a:chExt cx="1107347" cy="906010"/>
+          </a:xfrm>
+        </p:grpSpPr>
+        <p:sp>
+          <p:nvSpPr>
+            <p:cNvPr id="19" name="สามเหลี่ยมหน้าจั่ว 18">
+              <a:extLst>
+                <a:ext uri="{FF2B5EF4-FFF2-40B4-BE49-F238E27FC236}">
+                  <a16:creationId xmlns:a16="http://schemas.microsoft.com/office/drawing/2014/main" id="{9FDF2CAB-0C0F-ADCD-A4DF-0086FE43D49E}"/>
+                </a:ext>
+              </a:extLst>
+            </p:cNvPr>
+            <p:cNvSpPr/>
+            <p:nvPr/>
+          </p:nvSpPr>
+          <p:spPr>
+            <a:xfrm>
+              <a:off x="3439486" y="2911776"/>
+              <a:ext cx="1107347" cy="453005"/>
+            </a:xfrm>
+            <a:prstGeom prst="triangle">
+              <a:avLst/>
+            </a:prstGeom>
+            <a:solidFill>
+              <a:srgbClr val="FFFF00"/>
+            </a:solidFill>
+            <a:ln>
+              <a:noFill/>
+            </a:ln>
+          </p:spPr>
+          <p:style>
+            <a:lnRef idx="2">
+              <a:schemeClr val="accent1">
+                <a:shade val="15000"/>
+              </a:schemeClr>
+            </a:lnRef>
+            <a:fillRef idx="1">
+              <a:schemeClr val="accent1"/>
+            </a:fillRef>
+            <a:effectRef idx="0">
+              <a:schemeClr val="accent1"/>
+            </a:effectRef>
+            <a:fontRef idx="minor">
+              <a:schemeClr val="lt1"/>
+            </a:fontRef>
+          </p:style>
+          <p:txBody>
+            <a:bodyPr rtlCol="0" anchor="ctr"/>
+            <a:lstStyle/>
+            <a:p>
+              <a:pPr algn="ctr"/>
+              <a:endParaRPr lang="en-US">
+                <a:solidFill>
+                  <a:srgbClr val="FFFF00"/>
+                </a:solidFill>
+              </a:endParaRPr>
+            </a:p>
+          </p:txBody>
+        </p:sp>
+        <p:sp>
+          <p:nvSpPr>
+            <p:cNvPr id="20" name="สามเหลี่ยมหน้าจั่ว 19">
+              <a:extLst>
+                <a:ext uri="{FF2B5EF4-FFF2-40B4-BE49-F238E27FC236}">
+                  <a16:creationId xmlns:a16="http://schemas.microsoft.com/office/drawing/2014/main" id="{81942BED-A02D-4475-4AFA-0052537C787A}"/>
+                </a:ext>
+              </a:extLst>
+            </p:cNvPr>
+            <p:cNvSpPr/>
+            <p:nvPr/>
+          </p:nvSpPr>
+          <p:spPr>
+            <a:xfrm flipV="1">
+              <a:off x="3439486" y="3364781"/>
+              <a:ext cx="1107347" cy="453005"/>
+            </a:xfrm>
+            <a:prstGeom prst="triangle">
+              <a:avLst/>
+            </a:prstGeom>
+            <a:solidFill>
+              <a:srgbClr val="CCCC00"/>
+            </a:solidFill>
+            <a:ln>
+              <a:noFill/>
+            </a:ln>
+          </p:spPr>
+          <p:style>
+            <a:lnRef idx="2">
+              <a:schemeClr val="accent1">
+                <a:shade val="15000"/>
+              </a:schemeClr>
+            </a:lnRef>
+            <a:fillRef idx="1">
+              <a:schemeClr val="accent1"/>
+            </a:fillRef>
+            <a:effectRef idx="0">
+              <a:schemeClr val="accent1"/>
+            </a:effectRef>
+            <a:fontRef idx="minor">
+              <a:schemeClr val="lt1"/>
+            </a:fontRef>
+          </p:style>
+          <p:txBody>
+            <a:bodyPr rtlCol="0" anchor="ctr"/>
+            <a:lstStyle/>
+            <a:p>
+              <a:pPr algn="ctr"/>
+              <a:endParaRPr lang="en-US"/>
+            </a:p>
+          </p:txBody>
+        </p:sp>
+      </p:grpSp>
     </p:spTree>
     <p:extLst>
       <p:ext uri="{BB962C8B-B14F-4D97-AF65-F5344CB8AC3E}">

</xml_diff>